<commit_message>
- update dependencies version
</commit_message>
<xml_diff>
--- a/exec/fsm.pptx
+++ b/exec/fsm.pptx
@@ -259,7 +259,7 @@
           <a:p>
             <a:fld id="{57E9A0A7-21BD-44B3-AB95-80647529746D}" type="datetimeFigureOut">
               <a:rPr lang="zh-CN" altLang="en-US" smtClean="0"/>
-              <a:t>2022/5/24</a:t>
+              <a:t>2022/5/29</a:t>
             </a:fld>
             <a:endParaRPr lang="zh-CN" altLang="en-US"/>
           </a:p>
@@ -457,7 +457,7 @@
           <a:p>
             <a:fld id="{57E9A0A7-21BD-44B3-AB95-80647529746D}" type="datetimeFigureOut">
               <a:rPr lang="zh-CN" altLang="en-US" smtClean="0"/>
-              <a:t>2022/5/24</a:t>
+              <a:t>2022/5/29</a:t>
             </a:fld>
             <a:endParaRPr lang="zh-CN" altLang="en-US"/>
           </a:p>
@@ -665,7 +665,7 @@
           <a:p>
             <a:fld id="{57E9A0A7-21BD-44B3-AB95-80647529746D}" type="datetimeFigureOut">
               <a:rPr lang="zh-CN" altLang="en-US" smtClean="0"/>
-              <a:t>2022/5/24</a:t>
+              <a:t>2022/5/29</a:t>
             </a:fld>
             <a:endParaRPr lang="zh-CN" altLang="en-US"/>
           </a:p>
@@ -863,7 +863,7 @@
           <a:p>
             <a:fld id="{57E9A0A7-21BD-44B3-AB95-80647529746D}" type="datetimeFigureOut">
               <a:rPr lang="zh-CN" altLang="en-US" smtClean="0"/>
-              <a:t>2022/5/24</a:t>
+              <a:t>2022/5/29</a:t>
             </a:fld>
             <a:endParaRPr lang="zh-CN" altLang="en-US"/>
           </a:p>
@@ -1138,7 +1138,7 @@
           <a:p>
             <a:fld id="{57E9A0A7-21BD-44B3-AB95-80647529746D}" type="datetimeFigureOut">
               <a:rPr lang="zh-CN" altLang="en-US" smtClean="0"/>
-              <a:t>2022/5/24</a:t>
+              <a:t>2022/5/29</a:t>
             </a:fld>
             <a:endParaRPr lang="zh-CN" altLang="en-US"/>
           </a:p>
@@ -1403,7 +1403,7 @@
           <a:p>
             <a:fld id="{57E9A0A7-21BD-44B3-AB95-80647529746D}" type="datetimeFigureOut">
               <a:rPr lang="zh-CN" altLang="en-US" smtClean="0"/>
-              <a:t>2022/5/24</a:t>
+              <a:t>2022/5/29</a:t>
             </a:fld>
             <a:endParaRPr lang="zh-CN" altLang="en-US"/>
           </a:p>
@@ -1815,7 +1815,7 @@
           <a:p>
             <a:fld id="{57E9A0A7-21BD-44B3-AB95-80647529746D}" type="datetimeFigureOut">
               <a:rPr lang="zh-CN" altLang="en-US" smtClean="0"/>
-              <a:t>2022/5/24</a:t>
+              <a:t>2022/5/29</a:t>
             </a:fld>
             <a:endParaRPr lang="zh-CN" altLang="en-US"/>
           </a:p>
@@ -1956,7 +1956,7 @@
           <a:p>
             <a:fld id="{57E9A0A7-21BD-44B3-AB95-80647529746D}" type="datetimeFigureOut">
               <a:rPr lang="zh-CN" altLang="en-US" smtClean="0"/>
-              <a:t>2022/5/24</a:t>
+              <a:t>2022/5/29</a:t>
             </a:fld>
             <a:endParaRPr lang="zh-CN" altLang="en-US"/>
           </a:p>
@@ -2069,7 +2069,7 @@
           <a:p>
             <a:fld id="{57E9A0A7-21BD-44B3-AB95-80647529746D}" type="datetimeFigureOut">
               <a:rPr lang="zh-CN" altLang="en-US" smtClean="0"/>
-              <a:t>2022/5/24</a:t>
+              <a:t>2022/5/29</a:t>
             </a:fld>
             <a:endParaRPr lang="zh-CN" altLang="en-US"/>
           </a:p>
@@ -2380,7 +2380,7 @@
           <a:p>
             <a:fld id="{57E9A0A7-21BD-44B3-AB95-80647529746D}" type="datetimeFigureOut">
               <a:rPr lang="zh-CN" altLang="en-US" smtClean="0"/>
-              <a:t>2022/5/24</a:t>
+              <a:t>2022/5/29</a:t>
             </a:fld>
             <a:endParaRPr lang="zh-CN" altLang="en-US"/>
           </a:p>
@@ -2668,7 +2668,7 @@
           <a:p>
             <a:fld id="{57E9A0A7-21BD-44B3-AB95-80647529746D}" type="datetimeFigureOut">
               <a:rPr lang="zh-CN" altLang="en-US" smtClean="0"/>
-              <a:t>2022/5/24</a:t>
+              <a:t>2022/5/29</a:t>
             </a:fld>
             <a:endParaRPr lang="zh-CN" altLang="en-US"/>
           </a:p>
@@ -2909,7 +2909,7 @@
           <a:p>
             <a:fld id="{57E9A0A7-21BD-44B3-AB95-80647529746D}" type="datetimeFigureOut">
               <a:rPr lang="zh-CN" altLang="en-US" smtClean="0"/>
-              <a:t>2022/5/24</a:t>
+              <a:t>2022/5/29</a:t>
             </a:fld>
             <a:endParaRPr lang="zh-CN" altLang="en-US"/>
           </a:p>
@@ -5711,6 +5711,124 @@
           </a:p>
         </p:txBody>
       </p:sp>
+      <p:cxnSp>
+        <p:nvCxnSpPr>
+          <p:cNvPr id="4" name="连接符: 曲线 3">
+            <a:extLst>
+              <a:ext uri="{FF2B5EF4-FFF2-40B4-BE49-F238E27FC236}">
+                <a16:creationId xmlns:a16="http://schemas.microsoft.com/office/drawing/2014/main" id="{A5DC7844-FEC8-BADE-0676-2962508A5C2D}"/>
+              </a:ext>
+            </a:extLst>
+          </p:cNvPr>
+          <p:cNvCxnSpPr>
+            <a:cxnSpLocks/>
+            <a:stCxn id="22" idx="4"/>
+            <a:endCxn id="25" idx="2"/>
+          </p:cNvCxnSpPr>
+          <p:nvPr/>
+        </p:nvCxnSpPr>
+        <p:spPr>
+          <a:xfrm rot="5400000" flipH="1">
+            <a:off x="1520602" y="2402505"/>
+            <a:ext cx="1060839" cy="3168676"/>
+          </a:xfrm>
+          <a:prstGeom prst="curvedConnector4">
+            <a:avLst>
+              <a:gd name="adj1" fmla="val -107745"/>
+              <a:gd name="adj2" fmla="val 107214"/>
+            </a:avLst>
+          </a:prstGeom>
+          <a:ln>
+            <a:tailEnd type="triangle"/>
+          </a:ln>
+        </p:spPr>
+        <p:style>
+          <a:lnRef idx="1">
+            <a:schemeClr val="accent1"/>
+          </a:lnRef>
+          <a:fillRef idx="0">
+            <a:schemeClr val="accent1"/>
+          </a:fillRef>
+          <a:effectRef idx="0">
+            <a:schemeClr val="accent1"/>
+          </a:effectRef>
+          <a:fontRef idx="minor">
+            <a:schemeClr val="tx1"/>
+          </a:fontRef>
+        </p:style>
+      </p:cxnSp>
+      <p:sp>
+        <p:nvSpPr>
+          <p:cNvPr id="54" name="文本框 53">
+            <a:extLst>
+              <a:ext uri="{FF2B5EF4-FFF2-40B4-BE49-F238E27FC236}">
+                <a16:creationId xmlns:a16="http://schemas.microsoft.com/office/drawing/2014/main" id="{805EA594-EF1D-09EF-1BCB-CD91F7D41B1F}"/>
+              </a:ext>
+            </a:extLst>
+          </p:cNvPr>
+          <p:cNvSpPr txBox="1"/>
+          <p:nvPr/>
+        </p:nvSpPr>
+        <p:spPr>
+          <a:xfrm>
+            <a:off x="172471" y="4977989"/>
+            <a:ext cx="611065" cy="261610"/>
+          </a:xfrm>
+          <a:prstGeom prst="rect">
+            <a:avLst/>
+          </a:prstGeom>
+          <a:noFill/>
+        </p:spPr>
+        <p:txBody>
+          <a:bodyPr wrap="none" rtlCol="0">
+            <a:spAutoFit/>
+          </a:bodyPr>
+          <a:lstStyle/>
+          <a:p>
+            <a:r>
+              <a:rPr lang="en-US" altLang="zh-CN" sz="1100" dirty="0"/>
+              <a:t>Service</a:t>
+            </a:r>
+            <a:endParaRPr lang="zh-CN" altLang="en-US" sz="1100" dirty="0"/>
+          </a:p>
+        </p:txBody>
+      </p:sp>
+      <p:sp>
+        <p:nvSpPr>
+          <p:cNvPr id="15" name="文本框 14">
+            <a:extLst>
+              <a:ext uri="{FF2B5EF4-FFF2-40B4-BE49-F238E27FC236}">
+                <a16:creationId xmlns:a16="http://schemas.microsoft.com/office/drawing/2014/main" id="{D1272DEA-3D3C-159B-3FCD-BA88AE6D7CF5}"/>
+              </a:ext>
+            </a:extLst>
+          </p:cNvPr>
+          <p:cNvSpPr txBox="1"/>
+          <p:nvPr/>
+        </p:nvSpPr>
+        <p:spPr>
+          <a:xfrm>
+            <a:off x="22610" y="2456264"/>
+            <a:ext cx="2268570" cy="369332"/>
+          </a:xfrm>
+          <a:prstGeom prst="rect">
+            <a:avLst/>
+          </a:prstGeom>
+          <a:noFill/>
+        </p:spPr>
+        <p:txBody>
+          <a:bodyPr wrap="none" rtlCol="0">
+            <a:spAutoFit/>
+          </a:bodyPr>
+          <a:lstStyle/>
+          <a:p>
+            <a:r>
+              <a:rPr lang="en-US" altLang="zh-CN" dirty="0"/>
+              <a:t>Service only has one!</a:t>
+            </a:r>
+            <a:endParaRPr lang="zh-CN" altLang="en-US" dirty="0"/>
+          </a:p>
+        </p:txBody>
+      </p:sp>
     </p:spTree>
     <p:extLst>
       <p:ext uri="{BB962C8B-B14F-4D97-AF65-F5344CB8AC3E}">

</xml_diff>